<commit_message>
Changes to the powerpoint
</commit_message>
<xml_diff>
--- a/Project Presentation.pptx
+++ b/Project Presentation.pptx
@@ -5,7 +5,7 @@
     <p:sldMasterId id="2147483648" r:id="rId1"/>
   </p:sldMasterIdLst>
   <p:notesMasterIdLst>
-    <p:notesMasterId r:id="rId22"/>
+    <p:notesMasterId r:id="rId23"/>
   </p:notesMasterIdLst>
   <p:sldIdLst>
     <p:sldId id="256" r:id="rId2"/>
@@ -14,20 +14,21 @@
     <p:sldId id="259" r:id="rId5"/>
     <p:sldId id="260" r:id="rId6"/>
     <p:sldId id="261" r:id="rId7"/>
-    <p:sldId id="263" r:id="rId8"/>
-    <p:sldId id="264" r:id="rId9"/>
-    <p:sldId id="265" r:id="rId10"/>
-    <p:sldId id="267" r:id="rId11"/>
-    <p:sldId id="266" r:id="rId12"/>
-    <p:sldId id="268" r:id="rId13"/>
-    <p:sldId id="274" r:id="rId14"/>
-    <p:sldId id="275" r:id="rId15"/>
-    <p:sldId id="262" r:id="rId16"/>
-    <p:sldId id="269" r:id="rId17"/>
-    <p:sldId id="270" r:id="rId18"/>
-    <p:sldId id="271" r:id="rId19"/>
-    <p:sldId id="272" r:id="rId20"/>
-    <p:sldId id="273" r:id="rId21"/>
+    <p:sldId id="276" r:id="rId8"/>
+    <p:sldId id="263" r:id="rId9"/>
+    <p:sldId id="264" r:id="rId10"/>
+    <p:sldId id="265" r:id="rId11"/>
+    <p:sldId id="267" r:id="rId12"/>
+    <p:sldId id="266" r:id="rId13"/>
+    <p:sldId id="268" r:id="rId14"/>
+    <p:sldId id="274" r:id="rId15"/>
+    <p:sldId id="275" r:id="rId16"/>
+    <p:sldId id="262" r:id="rId17"/>
+    <p:sldId id="269" r:id="rId18"/>
+    <p:sldId id="270" r:id="rId19"/>
+    <p:sldId id="271" r:id="rId20"/>
+    <p:sldId id="272" r:id="rId21"/>
+    <p:sldId id="273" r:id="rId22"/>
   </p:sldIdLst>
   <p:sldSz cx="12192000" cy="6858000"/>
   <p:notesSz cx="6858000" cy="9144000"/>
@@ -126,6 +127,11 @@
       </a:defRPr>
     </a:lvl9pPr>
   </p:defaultTextStyle>
+  <p:extLst>
+    <p:ext uri="{EFAFB233-063F-42B5-8137-9DF3F51BA10A}">
+      <p15:sldGuideLst xmlns:p15="http://schemas.microsoft.com/office/powerpoint/2012/main"/>
+    </p:ext>
+  </p:extLst>
 </p:presentation>
 </file>
 
@@ -211,7 +217,7 @@
           <a:p>
             <a:fld id="{0DA68422-E51C-4F85-876D-B4485F7BD6ED}" type="datetimeFigureOut">
               <a:rPr lang="en-US" smtClean="0"/>
-              <a:t>3/11/2019</a:t>
+              <a:t>3/12/2019</a:t>
             </a:fld>
             <a:endParaRPr lang="en-US"/>
           </a:p>
@@ -642,7 +648,7 @@
           <a:p>
             <a:fld id="{77C70274-0375-4BC9-BC63-4173DCE5C12C}" type="slidenum">
               <a:rPr lang="en-US" smtClean="0"/>
-              <a:t>9</a:t>
+              <a:t>10</a:t>
             </a:fld>
             <a:endParaRPr lang="en-US"/>
           </a:p>
@@ -808,7 +814,7 @@
           <a:p>
             <a:fld id="{EAB5452C-E438-49C6-9E24-BD1801161A96}" type="datetimeFigureOut">
               <a:rPr lang="en-US" smtClean="0"/>
-              <a:t>3/11/2019</a:t>
+              <a:t>3/12/2019</a:t>
             </a:fld>
             <a:endParaRPr lang="en-US"/>
           </a:p>
@@ -1006,7 +1012,7 @@
           <a:p>
             <a:fld id="{EAB5452C-E438-49C6-9E24-BD1801161A96}" type="datetimeFigureOut">
               <a:rPr lang="en-US" smtClean="0"/>
-              <a:t>3/11/2019</a:t>
+              <a:t>3/12/2019</a:t>
             </a:fld>
             <a:endParaRPr lang="en-US"/>
           </a:p>
@@ -1214,7 +1220,7 @@
           <a:p>
             <a:fld id="{EAB5452C-E438-49C6-9E24-BD1801161A96}" type="datetimeFigureOut">
               <a:rPr lang="en-US" smtClean="0"/>
-              <a:t>3/11/2019</a:t>
+              <a:t>3/12/2019</a:t>
             </a:fld>
             <a:endParaRPr lang="en-US"/>
           </a:p>
@@ -1412,7 +1418,7 @@
           <a:p>
             <a:fld id="{EAB5452C-E438-49C6-9E24-BD1801161A96}" type="datetimeFigureOut">
               <a:rPr lang="en-US" smtClean="0"/>
-              <a:t>3/11/2019</a:t>
+              <a:t>3/12/2019</a:t>
             </a:fld>
             <a:endParaRPr lang="en-US"/>
           </a:p>
@@ -1687,7 +1693,7 @@
           <a:p>
             <a:fld id="{EAB5452C-E438-49C6-9E24-BD1801161A96}" type="datetimeFigureOut">
               <a:rPr lang="en-US" smtClean="0"/>
-              <a:t>3/11/2019</a:t>
+              <a:t>3/12/2019</a:t>
             </a:fld>
             <a:endParaRPr lang="en-US"/>
           </a:p>
@@ -1952,7 +1958,7 @@
           <a:p>
             <a:fld id="{EAB5452C-E438-49C6-9E24-BD1801161A96}" type="datetimeFigureOut">
               <a:rPr lang="en-US" smtClean="0"/>
-              <a:t>3/11/2019</a:t>
+              <a:t>3/12/2019</a:t>
             </a:fld>
             <a:endParaRPr lang="en-US"/>
           </a:p>
@@ -2364,7 +2370,7 @@
           <a:p>
             <a:fld id="{EAB5452C-E438-49C6-9E24-BD1801161A96}" type="datetimeFigureOut">
               <a:rPr lang="en-US" smtClean="0"/>
-              <a:t>3/11/2019</a:t>
+              <a:t>3/12/2019</a:t>
             </a:fld>
             <a:endParaRPr lang="en-US"/>
           </a:p>
@@ -2505,7 +2511,7 @@
           <a:p>
             <a:fld id="{EAB5452C-E438-49C6-9E24-BD1801161A96}" type="datetimeFigureOut">
               <a:rPr lang="en-US" smtClean="0"/>
-              <a:t>3/11/2019</a:t>
+              <a:t>3/12/2019</a:t>
             </a:fld>
             <a:endParaRPr lang="en-US"/>
           </a:p>
@@ -2618,7 +2624,7 @@
           <a:p>
             <a:fld id="{EAB5452C-E438-49C6-9E24-BD1801161A96}" type="datetimeFigureOut">
               <a:rPr lang="en-US" smtClean="0"/>
-              <a:t>3/11/2019</a:t>
+              <a:t>3/12/2019</a:t>
             </a:fld>
             <a:endParaRPr lang="en-US"/>
           </a:p>
@@ -2929,7 +2935,7 @@
           <a:p>
             <a:fld id="{EAB5452C-E438-49C6-9E24-BD1801161A96}" type="datetimeFigureOut">
               <a:rPr lang="en-US" smtClean="0"/>
-              <a:t>3/11/2019</a:t>
+              <a:t>3/12/2019</a:t>
             </a:fld>
             <a:endParaRPr lang="en-US"/>
           </a:p>
@@ -3217,7 +3223,7 @@
           <a:p>
             <a:fld id="{EAB5452C-E438-49C6-9E24-BD1801161A96}" type="datetimeFigureOut">
               <a:rPr lang="en-US" smtClean="0"/>
-              <a:t>3/11/2019</a:t>
+              <a:t>3/12/2019</a:t>
             </a:fld>
             <a:endParaRPr lang="en-US"/>
           </a:p>
@@ -3458,7 +3464,7 @@
           <a:p>
             <a:fld id="{EAB5452C-E438-49C6-9E24-BD1801161A96}" type="datetimeFigureOut">
               <a:rPr lang="en-US" smtClean="0"/>
-              <a:t>3/11/2019</a:t>
+              <a:t>3/12/2019</a:t>
             </a:fld>
             <a:endParaRPr lang="en-US"/>
           </a:p>
@@ -4198,6 +4204,66 @@
           <p:cNvPr id="4" name="Picture 3">
             <a:extLst>
               <a:ext uri="{FF2B5EF4-FFF2-40B4-BE49-F238E27FC236}">
+                <a16:creationId xmlns:a16="http://schemas.microsoft.com/office/drawing/2014/main" id="{3363BFAD-8594-4DCD-BC2E-B1677D7DA0BE}"/>
+              </a:ext>
+            </a:extLst>
+          </p:cNvPr>
+          <p:cNvPicPr>
+            <a:picLocks noChangeAspect="1"/>
+          </p:cNvPicPr>
+          <p:nvPr/>
+        </p:nvPicPr>
+        <p:blipFill>
+          <a:blip r:embed="rId3"/>
+          <a:stretch>
+            <a:fillRect/>
+          </a:stretch>
+        </p:blipFill>
+        <p:spPr>
+          <a:xfrm>
+            <a:off x="1484288" y="140828"/>
+            <a:ext cx="9223424" cy="6576343"/>
+          </a:xfrm>
+          <a:prstGeom prst="rect">
+            <a:avLst/>
+          </a:prstGeom>
+        </p:spPr>
+      </p:pic>
+    </p:spTree>
+    <p:extLst>
+      <p:ext uri="{BB962C8B-B14F-4D97-AF65-F5344CB8AC3E}">
+        <p14:creationId xmlns:p14="http://schemas.microsoft.com/office/powerpoint/2010/main" val="3097196736"/>
+      </p:ext>
+    </p:extLst>
+  </p:cSld>
+  <p:clrMapOvr>
+    <a:masterClrMapping/>
+  </p:clrMapOvr>
+</p:sld>
+</file>
+
+<file path=ppt/slides/slide11.xml><?xml version="1.0" encoding="utf-8"?>
+<p:sld xmlns:a="http://schemas.openxmlformats.org/drawingml/2006/main" xmlns:r="http://schemas.openxmlformats.org/officeDocument/2006/relationships" xmlns:p="http://schemas.openxmlformats.org/presentationml/2006/main">
+  <p:cSld>
+    <p:spTree>
+      <p:nvGrpSpPr>
+        <p:cNvPr id="1" name=""/>
+        <p:cNvGrpSpPr/>
+        <p:nvPr/>
+      </p:nvGrpSpPr>
+      <p:grpSpPr>
+        <a:xfrm>
+          <a:off x="0" y="0"/>
+          <a:ext cx="0" cy="0"/>
+          <a:chOff x="0" y="0"/>
+          <a:chExt cx="0" cy="0"/>
+        </a:xfrm>
+      </p:grpSpPr>
+      <p:pic>
+        <p:nvPicPr>
+          <p:cNvPr id="4" name="Picture 3">
+            <a:extLst>
+              <a:ext uri="{FF2B5EF4-FFF2-40B4-BE49-F238E27FC236}">
                 <a16:creationId xmlns:a16="http://schemas.microsoft.com/office/drawing/2014/main" id="{C2BB8586-473A-432B-B813-70C3CE94C34E}"/>
               </a:ext>
             </a:extLst>
@@ -4272,7 +4338,7 @@
 </p:sld>
 </file>
 
-<file path=ppt/slides/slide11.xml><?xml version="1.0" encoding="utf-8"?>
+<file path=ppt/slides/slide12.xml><?xml version="1.0" encoding="utf-8"?>
 <p:sld xmlns:a="http://schemas.openxmlformats.org/drawingml/2006/main" xmlns:r="http://schemas.openxmlformats.org/officeDocument/2006/relationships" xmlns:p="http://schemas.openxmlformats.org/presentationml/2006/main">
   <p:cSld>
     <p:spTree>
@@ -4332,7 +4398,7 @@
 </p:sld>
 </file>
 
-<file path=ppt/slides/slide12.xml><?xml version="1.0" encoding="utf-8"?>
+<file path=ppt/slides/slide13.xml><?xml version="1.0" encoding="utf-8"?>
 <p:sld xmlns:a="http://schemas.openxmlformats.org/drawingml/2006/main" xmlns:r="http://schemas.openxmlformats.org/officeDocument/2006/relationships" xmlns:p="http://schemas.openxmlformats.org/presentationml/2006/main">
   <p:cSld>
     <p:spTree>
@@ -4462,86 +4528,6 @@
 </p:sld>
 </file>
 
-<file path=ppt/slides/slide13.xml><?xml version="1.0" encoding="utf-8"?>
-<p:sld xmlns:a="http://schemas.openxmlformats.org/drawingml/2006/main" xmlns:r="http://schemas.openxmlformats.org/officeDocument/2006/relationships" xmlns:p="http://schemas.openxmlformats.org/presentationml/2006/main">
-  <p:cSld>
-    <p:spTree>
-      <p:nvGrpSpPr>
-        <p:cNvPr id="1" name=""/>
-        <p:cNvGrpSpPr/>
-        <p:nvPr/>
-      </p:nvGrpSpPr>
-      <p:grpSpPr>
-        <a:xfrm>
-          <a:off x="0" y="0"/>
-          <a:ext cx="0" cy="0"/>
-          <a:chOff x="0" y="0"/>
-          <a:chExt cx="0" cy="0"/>
-        </a:xfrm>
-      </p:grpSpPr>
-      <p:sp>
-        <p:nvSpPr>
-          <p:cNvPr id="2" name="Title 1">
-            <a:extLst>
-              <a:ext uri="{FF2B5EF4-FFF2-40B4-BE49-F238E27FC236}">
-                <a16:creationId xmlns:a16="http://schemas.microsoft.com/office/drawing/2014/main" id="{BC2B55BE-5D80-40DB-9A24-7FEDBF9642C8}"/>
-              </a:ext>
-            </a:extLst>
-          </p:cNvPr>
-          <p:cNvSpPr>
-            <a:spLocks noGrp="1"/>
-          </p:cNvSpPr>
-          <p:nvPr>
-            <p:ph type="title"/>
-          </p:nvPr>
-        </p:nvSpPr>
-        <p:spPr/>
-        <p:txBody>
-          <a:bodyPr/>
-          <a:lstStyle/>
-          <a:p>
-            <a:endParaRPr lang="en-US"/>
-          </a:p>
-        </p:txBody>
-      </p:sp>
-      <p:sp>
-        <p:nvSpPr>
-          <p:cNvPr id="3" name="Content Placeholder 2">
-            <a:extLst>
-              <a:ext uri="{FF2B5EF4-FFF2-40B4-BE49-F238E27FC236}">
-                <a16:creationId xmlns:a16="http://schemas.microsoft.com/office/drawing/2014/main" id="{FF29E8EA-4B9D-4DF4-BCD4-2C8CFBED35A2}"/>
-              </a:ext>
-            </a:extLst>
-          </p:cNvPr>
-          <p:cNvSpPr>
-            <a:spLocks noGrp="1"/>
-          </p:cNvSpPr>
-          <p:nvPr>
-            <p:ph idx="1"/>
-          </p:nvPr>
-        </p:nvSpPr>
-        <p:spPr/>
-        <p:txBody>
-          <a:bodyPr/>
-          <a:lstStyle/>
-          <a:p>
-            <a:endParaRPr lang="en-US"/>
-          </a:p>
-        </p:txBody>
-      </p:sp>
-    </p:spTree>
-    <p:extLst>
-      <p:ext uri="{BB962C8B-B14F-4D97-AF65-F5344CB8AC3E}">
-        <p14:creationId xmlns:p14="http://schemas.microsoft.com/office/powerpoint/2010/main" val="2034113325"/>
-      </p:ext>
-    </p:extLst>
-  </p:cSld>
-  <p:clrMapOvr>
-    <a:masterClrMapping/>
-  </p:clrMapOvr>
-</p:sld>
-</file>
-
 <file path=ppt/slides/slide14.xml><?xml version="1.0" encoding="utf-8"?>
 <p:sld xmlns:a="http://schemas.openxmlformats.org/drawingml/2006/main" xmlns:r="http://schemas.openxmlformats.org/officeDocument/2006/relationships" xmlns:p="http://schemas.openxmlformats.org/presentationml/2006/main">
   <p:cSld>
@@ -4564,7 +4550,7 @@
           <p:cNvPr id="2" name="Title 1">
             <a:extLst>
               <a:ext uri="{FF2B5EF4-FFF2-40B4-BE49-F238E27FC236}">
-                <a16:creationId xmlns:a16="http://schemas.microsoft.com/office/drawing/2014/main" id="{2A7E08FB-3069-415B-BE83-8304B610038B}"/>
+                <a16:creationId xmlns:a16="http://schemas.microsoft.com/office/drawing/2014/main" id="{BC2B55BE-5D80-40DB-9A24-7FEDBF9642C8}"/>
               </a:ext>
             </a:extLst>
           </p:cNvPr>
@@ -4589,7 +4575,7 @@
           <p:cNvPr id="3" name="Content Placeholder 2">
             <a:extLst>
               <a:ext uri="{FF2B5EF4-FFF2-40B4-BE49-F238E27FC236}">
-                <a16:creationId xmlns:a16="http://schemas.microsoft.com/office/drawing/2014/main" id="{463B79CD-172F-4555-9EF1-D5288066546F}"/>
+                <a16:creationId xmlns:a16="http://schemas.microsoft.com/office/drawing/2014/main" id="{FF29E8EA-4B9D-4DF4-BCD4-2C8CFBED35A2}"/>
               </a:ext>
             </a:extLst>
           </p:cNvPr>
@@ -4612,7 +4598,7 @@
     </p:spTree>
     <p:extLst>
       <p:ext uri="{BB962C8B-B14F-4D97-AF65-F5344CB8AC3E}">
-        <p14:creationId xmlns:p14="http://schemas.microsoft.com/office/powerpoint/2010/main" val="2537139263"/>
+        <p14:creationId xmlns:p14="http://schemas.microsoft.com/office/powerpoint/2010/main" val="2034113325"/>
       </p:ext>
     </p:extLst>
   </p:cSld>
@@ -4644,6 +4630,86 @@
           <p:cNvPr id="2" name="Title 1">
             <a:extLst>
               <a:ext uri="{FF2B5EF4-FFF2-40B4-BE49-F238E27FC236}">
+                <a16:creationId xmlns:a16="http://schemas.microsoft.com/office/drawing/2014/main" id="{2A7E08FB-3069-415B-BE83-8304B610038B}"/>
+              </a:ext>
+            </a:extLst>
+          </p:cNvPr>
+          <p:cNvSpPr>
+            <a:spLocks noGrp="1"/>
+          </p:cNvSpPr>
+          <p:nvPr>
+            <p:ph type="title"/>
+          </p:nvPr>
+        </p:nvSpPr>
+        <p:spPr/>
+        <p:txBody>
+          <a:bodyPr/>
+          <a:lstStyle/>
+          <a:p>
+            <a:endParaRPr lang="en-US"/>
+          </a:p>
+        </p:txBody>
+      </p:sp>
+      <p:sp>
+        <p:nvSpPr>
+          <p:cNvPr id="3" name="Content Placeholder 2">
+            <a:extLst>
+              <a:ext uri="{FF2B5EF4-FFF2-40B4-BE49-F238E27FC236}">
+                <a16:creationId xmlns:a16="http://schemas.microsoft.com/office/drawing/2014/main" id="{463B79CD-172F-4555-9EF1-D5288066546F}"/>
+              </a:ext>
+            </a:extLst>
+          </p:cNvPr>
+          <p:cNvSpPr>
+            <a:spLocks noGrp="1"/>
+          </p:cNvSpPr>
+          <p:nvPr>
+            <p:ph idx="1"/>
+          </p:nvPr>
+        </p:nvSpPr>
+        <p:spPr/>
+        <p:txBody>
+          <a:bodyPr/>
+          <a:lstStyle/>
+          <a:p>
+            <a:endParaRPr lang="en-US"/>
+          </a:p>
+        </p:txBody>
+      </p:sp>
+    </p:spTree>
+    <p:extLst>
+      <p:ext uri="{BB962C8B-B14F-4D97-AF65-F5344CB8AC3E}">
+        <p14:creationId xmlns:p14="http://schemas.microsoft.com/office/powerpoint/2010/main" val="2537139263"/>
+      </p:ext>
+    </p:extLst>
+  </p:cSld>
+  <p:clrMapOvr>
+    <a:masterClrMapping/>
+  </p:clrMapOvr>
+</p:sld>
+</file>
+
+<file path=ppt/slides/slide16.xml><?xml version="1.0" encoding="utf-8"?>
+<p:sld xmlns:a="http://schemas.openxmlformats.org/drawingml/2006/main" xmlns:r="http://schemas.openxmlformats.org/officeDocument/2006/relationships" xmlns:p="http://schemas.openxmlformats.org/presentationml/2006/main">
+  <p:cSld>
+    <p:spTree>
+      <p:nvGrpSpPr>
+        <p:cNvPr id="1" name=""/>
+        <p:cNvGrpSpPr/>
+        <p:nvPr/>
+      </p:nvGrpSpPr>
+      <p:grpSpPr>
+        <a:xfrm>
+          <a:off x="0" y="0"/>
+          <a:ext cx="0" cy="0"/>
+          <a:chOff x="0" y="0"/>
+          <a:chExt cx="0" cy="0"/>
+        </a:xfrm>
+      </p:grpSpPr>
+      <p:sp>
+        <p:nvSpPr>
+          <p:cNvPr id="2" name="Title 1">
+            <a:extLst>
+              <a:ext uri="{FF2B5EF4-FFF2-40B4-BE49-F238E27FC236}">
                 <a16:creationId xmlns:a16="http://schemas.microsoft.com/office/drawing/2014/main" id="{BEE12DD3-4FC8-40EC-9CE6-B874524424F7}"/>
               </a:ext>
             </a:extLst>
@@ -4687,8 +4753,8 @@
             <a:chExt cx="1070091" cy="877944"/>
           </a:xfrm>
         </p:grpSpPr>
-        <mc:AlternateContent xmlns:mc="http://schemas.openxmlformats.org/markup-compatibility/2006">
-          <mc:Choice xmlns:a14="http://schemas.microsoft.com/office/drawing/2010/main" Requires="a14">
+        <mc:AlternateContent xmlns:mc="http://schemas.openxmlformats.org/markup-compatibility/2006" xmlns:a14="http://schemas.microsoft.com/office/drawing/2010/main">
+          <mc:Choice Requires="a14">
             <p:sp>
               <p:nvSpPr>
                 <p:cNvPr id="10" name="TextBox 9">
@@ -4717,6 +4783,7 @@
                 </a:bodyPr>
                 <a:lstStyle/>
                 <a:p>
+                  <a:pPr/>
                   <a14:m>
                     <m:oMathPara xmlns:m="http://schemas.openxmlformats.org/officeDocument/2006/math">
                       <m:oMathParaPr>
@@ -4763,7 +4830,7 @@
               </p:txBody>
             </p:sp>
           </mc:Choice>
-          <mc:Fallback>
+          <mc:Fallback xmlns="">
             <p:sp>
               <p:nvSpPr>
                 <p:cNvPr id="10" name="TextBox 9">
@@ -4808,8 +4875,8 @@
             </p:sp>
           </mc:Fallback>
         </mc:AlternateContent>
-        <mc:AlternateContent xmlns:mc="http://schemas.openxmlformats.org/markup-compatibility/2006">
-          <mc:Choice xmlns:a14="http://schemas.microsoft.com/office/drawing/2010/main" Requires="a14">
+        <mc:AlternateContent xmlns:mc="http://schemas.openxmlformats.org/markup-compatibility/2006" xmlns:a14="http://schemas.microsoft.com/office/drawing/2010/main">
+          <mc:Choice Requires="a14">
             <p:sp>
               <p:nvSpPr>
                 <p:cNvPr id="11" name="TextBox 10">
@@ -4838,6 +4905,7 @@
                 </a:bodyPr>
                 <a:lstStyle/>
                 <a:p>
+                  <a:pPr/>
                   <a14:m>
                     <m:oMathPara xmlns:m="http://schemas.openxmlformats.org/officeDocument/2006/math">
                       <m:oMathParaPr>
@@ -4891,7 +4959,7 @@
               </p:txBody>
             </p:sp>
           </mc:Choice>
-          <mc:Fallback>
+          <mc:Fallback xmlns="">
             <p:sp>
               <p:nvSpPr>
                 <p:cNvPr id="11" name="TextBox 10">
@@ -4957,8 +5025,8 @@
             <a:chExt cx="2741832" cy="788549"/>
           </a:xfrm>
         </p:grpSpPr>
-        <mc:AlternateContent xmlns:mc="http://schemas.openxmlformats.org/markup-compatibility/2006">
-          <mc:Choice xmlns:a14="http://schemas.microsoft.com/office/drawing/2010/main" Requires="a14">
+        <mc:AlternateContent xmlns:mc="http://schemas.openxmlformats.org/markup-compatibility/2006" xmlns:a14="http://schemas.microsoft.com/office/drawing/2010/main">
+          <mc:Choice Requires="a14">
             <p:sp>
               <p:nvSpPr>
                 <p:cNvPr id="6" name="TextBox 5">
@@ -4987,6 +5055,7 @@
                 </a:bodyPr>
                 <a:lstStyle/>
                 <a:p>
+                  <a:pPr/>
                   <a14:m>
                     <m:oMathPara xmlns:m="http://schemas.openxmlformats.org/officeDocument/2006/math">
                       <m:oMathParaPr>
@@ -5100,7 +5169,7 @@
               </p:txBody>
             </p:sp>
           </mc:Choice>
-          <mc:Fallback>
+          <mc:Fallback xmlns="">
             <p:sp>
               <p:nvSpPr>
                 <p:cNvPr id="6" name="TextBox 5">
@@ -5145,8 +5214,8 @@
             </p:sp>
           </mc:Fallback>
         </mc:AlternateContent>
-        <mc:AlternateContent xmlns:mc="http://schemas.openxmlformats.org/markup-compatibility/2006">
-          <mc:Choice xmlns:a14="http://schemas.microsoft.com/office/drawing/2010/main" Requires="a14">
+        <mc:AlternateContent xmlns:mc="http://schemas.openxmlformats.org/markup-compatibility/2006" xmlns:a14="http://schemas.microsoft.com/office/drawing/2010/main">
+          <mc:Choice Requires="a14">
             <p:sp>
               <p:nvSpPr>
                 <p:cNvPr id="12" name="TextBox 11">
@@ -5175,6 +5244,7 @@
                 </a:bodyPr>
                 <a:lstStyle/>
                 <a:p>
+                  <a:pPr/>
                   <a14:m>
                     <m:oMathPara xmlns:m="http://schemas.openxmlformats.org/officeDocument/2006/math">
                       <m:oMathParaPr>
@@ -5195,7 +5265,7 @@
               </p:txBody>
             </p:sp>
           </mc:Choice>
-          <mc:Fallback>
+          <mc:Fallback xmlns="">
             <p:sp>
               <p:nvSpPr>
                 <p:cNvPr id="12" name="TextBox 11">
@@ -5261,8 +5331,8 @@
             <a:chExt cx="3129062" cy="788549"/>
           </a:xfrm>
         </p:grpSpPr>
-        <mc:AlternateContent xmlns:mc="http://schemas.openxmlformats.org/markup-compatibility/2006">
-          <mc:Choice xmlns:a14="http://schemas.microsoft.com/office/drawing/2010/main" Requires="a14">
+        <mc:AlternateContent xmlns:mc="http://schemas.openxmlformats.org/markup-compatibility/2006" xmlns:a14="http://schemas.microsoft.com/office/drawing/2010/main">
+          <mc:Choice Requires="a14">
             <p:sp>
               <p:nvSpPr>
                 <p:cNvPr id="9" name="TextBox 8">
@@ -5291,6 +5361,7 @@
                 </a:bodyPr>
                 <a:lstStyle/>
                 <a:p>
+                  <a:pPr/>
                   <a14:m>
                     <m:oMathPara xmlns:m="http://schemas.openxmlformats.org/officeDocument/2006/math">
                       <m:oMathParaPr>
@@ -5387,7 +5458,7 @@
               </p:txBody>
             </p:sp>
           </mc:Choice>
-          <mc:Fallback>
+          <mc:Fallback xmlns="">
             <p:sp>
               <p:nvSpPr>
                 <p:cNvPr id="9" name="TextBox 8">
@@ -5432,8 +5503,8 @@
             </p:sp>
           </mc:Fallback>
         </mc:AlternateContent>
-        <mc:AlternateContent xmlns:mc="http://schemas.openxmlformats.org/markup-compatibility/2006">
-          <mc:Choice xmlns:a14="http://schemas.microsoft.com/office/drawing/2010/main" Requires="a14">
+        <mc:AlternateContent xmlns:mc="http://schemas.openxmlformats.org/markup-compatibility/2006" xmlns:a14="http://schemas.microsoft.com/office/drawing/2010/main">
+          <mc:Choice Requires="a14">
             <p:sp>
               <p:nvSpPr>
                 <p:cNvPr id="13" name="TextBox 12">
@@ -5462,6 +5533,7 @@
                 </a:bodyPr>
                 <a:lstStyle/>
                 <a:p>
+                  <a:pPr/>
                   <a14:m>
                     <m:oMathPara xmlns:m="http://schemas.openxmlformats.org/officeDocument/2006/math">
                       <m:oMathParaPr>
@@ -5494,7 +5566,7 @@
               </p:txBody>
             </p:sp>
           </mc:Choice>
-          <mc:Fallback>
+          <mc:Fallback xmlns="">
             <p:sp>
               <p:nvSpPr>
                 <p:cNvPr id="13" name="TextBox 12">
@@ -5553,7 +5625,7 @@
 </p:sld>
 </file>
 
-<file path=ppt/slides/slide16.xml><?xml version="1.0" encoding="utf-8"?>
+<file path=ppt/slides/slide17.xml><?xml version="1.0" encoding="utf-8"?>
 <p:sld xmlns:a="http://schemas.openxmlformats.org/drawingml/2006/main" xmlns:r="http://schemas.openxmlformats.org/officeDocument/2006/relationships" xmlns:p="http://schemas.openxmlformats.org/presentationml/2006/main">
   <p:cSld>
     <p:spTree>
@@ -5641,7 +5713,7 @@
 </p:sld>
 </file>
 
-<file path=ppt/slides/slide17.xml><?xml version="1.0" encoding="utf-8"?>
+<file path=ppt/slides/slide18.xml><?xml version="1.0" encoding="utf-8"?>
 <p:sld xmlns:a="http://schemas.openxmlformats.org/drawingml/2006/main" xmlns:r="http://schemas.openxmlformats.org/officeDocument/2006/relationships" xmlns:p="http://schemas.openxmlformats.org/presentationml/2006/main">
   <p:cSld>
     <p:spTree>
@@ -5701,7 +5773,7 @@
 </p:sld>
 </file>
 
-<file path=ppt/slides/slide18.xml><?xml version="1.0" encoding="utf-8"?>
+<file path=ppt/slides/slide19.xml><?xml version="1.0" encoding="utf-8"?>
 <p:sld xmlns:a="http://schemas.openxmlformats.org/drawingml/2006/main" xmlns:r="http://schemas.openxmlformats.org/officeDocument/2006/relationships" xmlns:p="http://schemas.openxmlformats.org/presentationml/2006/main">
   <p:cSld>
     <p:spTree>
@@ -5752,138 +5824,6 @@
     <p:extLst>
       <p:ext uri="{BB962C8B-B14F-4D97-AF65-F5344CB8AC3E}">
         <p14:creationId xmlns:p14="http://schemas.microsoft.com/office/powerpoint/2010/main" val="3855396002"/>
-      </p:ext>
-    </p:extLst>
-  </p:cSld>
-  <p:clrMapOvr>
-    <a:masterClrMapping/>
-  </p:clrMapOvr>
-</p:sld>
-</file>
-
-<file path=ppt/slides/slide19.xml><?xml version="1.0" encoding="utf-8"?>
-<p:sld xmlns:a="http://schemas.openxmlformats.org/drawingml/2006/main" xmlns:r="http://schemas.openxmlformats.org/officeDocument/2006/relationships" xmlns:p="http://schemas.openxmlformats.org/presentationml/2006/main">
-  <p:cSld>
-    <p:spTree>
-      <p:nvGrpSpPr>
-        <p:cNvPr id="1" name=""/>
-        <p:cNvGrpSpPr/>
-        <p:nvPr/>
-      </p:nvGrpSpPr>
-      <p:grpSpPr>
-        <a:xfrm>
-          <a:off x="0" y="0"/>
-          <a:ext cx="0" cy="0"/>
-          <a:chOff x="0" y="0"/>
-          <a:chExt cx="0" cy="0"/>
-        </a:xfrm>
-      </p:grpSpPr>
-      <p:sp>
-        <p:nvSpPr>
-          <p:cNvPr id="2" name="Title 1">
-            <a:extLst>
-              <a:ext uri="{FF2B5EF4-FFF2-40B4-BE49-F238E27FC236}">
-                <a16:creationId xmlns:a16="http://schemas.microsoft.com/office/drawing/2014/main" id="{796A6F57-AF99-4B25-A5D9-7108AF74A110}"/>
-              </a:ext>
-            </a:extLst>
-          </p:cNvPr>
-          <p:cNvSpPr>
-            <a:spLocks noGrp="1"/>
-          </p:cNvSpPr>
-          <p:nvPr>
-            <p:ph type="title"/>
-          </p:nvPr>
-        </p:nvSpPr>
-        <p:spPr/>
-        <p:txBody>
-          <a:bodyPr/>
-          <a:lstStyle/>
-          <a:p>
-            <a:r>
-              <a:rPr lang="en-US" dirty="0"/>
-              <a:t>Shadow Prices</a:t>
-            </a:r>
-          </a:p>
-        </p:txBody>
-      </p:sp>
-      <p:pic>
-        <p:nvPicPr>
-          <p:cNvPr id="4" name="Content Placeholder 3">
-            <a:extLst>
-              <a:ext uri="{FF2B5EF4-FFF2-40B4-BE49-F238E27FC236}">
-                <a16:creationId xmlns:a16="http://schemas.microsoft.com/office/drawing/2014/main" id="{A1A37381-23B7-4425-83C6-2F00D20B8117}"/>
-              </a:ext>
-            </a:extLst>
-          </p:cNvPr>
-          <p:cNvPicPr>
-            <a:picLocks noGrp="1" noChangeAspect="1"/>
-          </p:cNvPicPr>
-          <p:nvPr>
-            <p:ph idx="1"/>
-          </p:nvPr>
-        </p:nvPicPr>
-        <p:blipFill>
-          <a:blip r:embed="rId2"/>
-          <a:stretch>
-            <a:fillRect/>
-          </a:stretch>
-        </p:blipFill>
-        <p:spPr>
-          <a:xfrm>
-            <a:off x="1208675" y="2003314"/>
-            <a:ext cx="10145125" cy="1682421"/>
-          </a:xfrm>
-          <a:prstGeom prst="rect">
-            <a:avLst/>
-          </a:prstGeom>
-        </p:spPr>
-      </p:pic>
-      <p:pic>
-        <p:nvPicPr>
-          <p:cNvPr id="5" name="Picture 4">
-            <a:extLst>
-              <a:ext uri="{FF2B5EF4-FFF2-40B4-BE49-F238E27FC236}">
-                <a16:creationId xmlns:a16="http://schemas.microsoft.com/office/drawing/2014/main" id="{29D42779-E2EC-43E4-B193-B528665EF88B}"/>
-              </a:ext>
-            </a:extLst>
-          </p:cNvPr>
-          <p:cNvPicPr>
-            <a:picLocks noChangeAspect="1"/>
-          </p:cNvPicPr>
-          <p:nvPr/>
-        </p:nvPicPr>
-        <p:blipFill>
-          <a:blip r:embed="rId3">
-            <a:extLst>
-              <a:ext uri="{BEBA8EAE-BF5A-486C-A8C5-ECC9F3942E4B}">
-                <a14:imgProps xmlns:a14="http://schemas.microsoft.com/office/drawing/2010/main">
-                  <a14:imgLayer r:embed="rId4">
-                    <a14:imgEffect>
-                      <a14:sharpenSoften amount="50000"/>
-                    </a14:imgEffect>
-                  </a14:imgLayer>
-                </a14:imgProps>
-              </a:ext>
-            </a:extLst>
-          </a:blip>
-          <a:stretch>
-            <a:fillRect/>
-          </a:stretch>
-        </p:blipFill>
-        <p:spPr>
-          <a:xfrm>
-            <a:off x="1294604" y="4530529"/>
-            <a:ext cx="10059196" cy="871465"/>
-          </a:xfrm>
-          <a:prstGeom prst="rect">
-            <a:avLst/>
-          </a:prstGeom>
-        </p:spPr>
-      </p:pic>
-    </p:spTree>
-    <p:extLst>
-      <p:ext uri="{BB962C8B-B14F-4D97-AF65-F5344CB8AC3E}">
-        <p14:creationId xmlns:p14="http://schemas.microsoft.com/office/powerpoint/2010/main" val="3856531182"/>
       </p:ext>
     </p:extLst>
   </p:cSld>
@@ -6053,6 +5993,138 @@
           <p:cNvPr id="2" name="Title 1">
             <a:extLst>
               <a:ext uri="{FF2B5EF4-FFF2-40B4-BE49-F238E27FC236}">
+                <a16:creationId xmlns:a16="http://schemas.microsoft.com/office/drawing/2014/main" id="{796A6F57-AF99-4B25-A5D9-7108AF74A110}"/>
+              </a:ext>
+            </a:extLst>
+          </p:cNvPr>
+          <p:cNvSpPr>
+            <a:spLocks noGrp="1"/>
+          </p:cNvSpPr>
+          <p:nvPr>
+            <p:ph type="title"/>
+          </p:nvPr>
+        </p:nvSpPr>
+        <p:spPr/>
+        <p:txBody>
+          <a:bodyPr/>
+          <a:lstStyle/>
+          <a:p>
+            <a:r>
+              <a:rPr lang="en-US" dirty="0"/>
+              <a:t>Shadow Prices</a:t>
+            </a:r>
+          </a:p>
+        </p:txBody>
+      </p:sp>
+      <p:pic>
+        <p:nvPicPr>
+          <p:cNvPr id="4" name="Content Placeholder 3">
+            <a:extLst>
+              <a:ext uri="{FF2B5EF4-FFF2-40B4-BE49-F238E27FC236}">
+                <a16:creationId xmlns:a16="http://schemas.microsoft.com/office/drawing/2014/main" id="{A1A37381-23B7-4425-83C6-2F00D20B8117}"/>
+              </a:ext>
+            </a:extLst>
+          </p:cNvPr>
+          <p:cNvPicPr>
+            <a:picLocks noGrp="1" noChangeAspect="1"/>
+          </p:cNvPicPr>
+          <p:nvPr>
+            <p:ph idx="1"/>
+          </p:nvPr>
+        </p:nvPicPr>
+        <p:blipFill>
+          <a:blip r:embed="rId2"/>
+          <a:stretch>
+            <a:fillRect/>
+          </a:stretch>
+        </p:blipFill>
+        <p:spPr>
+          <a:xfrm>
+            <a:off x="1208675" y="2003314"/>
+            <a:ext cx="10145125" cy="1682421"/>
+          </a:xfrm>
+          <a:prstGeom prst="rect">
+            <a:avLst/>
+          </a:prstGeom>
+        </p:spPr>
+      </p:pic>
+      <p:pic>
+        <p:nvPicPr>
+          <p:cNvPr id="5" name="Picture 4">
+            <a:extLst>
+              <a:ext uri="{FF2B5EF4-FFF2-40B4-BE49-F238E27FC236}">
+                <a16:creationId xmlns:a16="http://schemas.microsoft.com/office/drawing/2014/main" id="{29D42779-E2EC-43E4-B193-B528665EF88B}"/>
+              </a:ext>
+            </a:extLst>
+          </p:cNvPr>
+          <p:cNvPicPr>
+            <a:picLocks noChangeAspect="1"/>
+          </p:cNvPicPr>
+          <p:nvPr/>
+        </p:nvPicPr>
+        <p:blipFill>
+          <a:blip r:embed="rId3">
+            <a:extLst>
+              <a:ext uri="{BEBA8EAE-BF5A-486C-A8C5-ECC9F3942E4B}">
+                <a14:imgProps xmlns:a14="http://schemas.microsoft.com/office/drawing/2010/main">
+                  <a14:imgLayer r:embed="rId4">
+                    <a14:imgEffect>
+                      <a14:sharpenSoften amount="50000"/>
+                    </a14:imgEffect>
+                  </a14:imgLayer>
+                </a14:imgProps>
+              </a:ext>
+            </a:extLst>
+          </a:blip>
+          <a:stretch>
+            <a:fillRect/>
+          </a:stretch>
+        </p:blipFill>
+        <p:spPr>
+          <a:xfrm>
+            <a:off x="1294604" y="4530529"/>
+            <a:ext cx="10059196" cy="871465"/>
+          </a:xfrm>
+          <a:prstGeom prst="rect">
+            <a:avLst/>
+          </a:prstGeom>
+        </p:spPr>
+      </p:pic>
+    </p:spTree>
+    <p:extLst>
+      <p:ext uri="{BB962C8B-B14F-4D97-AF65-F5344CB8AC3E}">
+        <p14:creationId xmlns:p14="http://schemas.microsoft.com/office/powerpoint/2010/main" val="3856531182"/>
+      </p:ext>
+    </p:extLst>
+  </p:cSld>
+  <p:clrMapOvr>
+    <a:masterClrMapping/>
+  </p:clrMapOvr>
+</p:sld>
+</file>
+
+<file path=ppt/slides/slide21.xml><?xml version="1.0" encoding="utf-8"?>
+<p:sld xmlns:a="http://schemas.openxmlformats.org/drawingml/2006/main" xmlns:r="http://schemas.openxmlformats.org/officeDocument/2006/relationships" xmlns:p="http://schemas.openxmlformats.org/presentationml/2006/main">
+  <p:cSld>
+    <p:spTree>
+      <p:nvGrpSpPr>
+        <p:cNvPr id="1" name=""/>
+        <p:cNvGrpSpPr/>
+        <p:nvPr/>
+      </p:nvGrpSpPr>
+      <p:grpSpPr>
+        <a:xfrm>
+          <a:off x="0" y="0"/>
+          <a:ext cx="0" cy="0"/>
+          <a:chOff x="0" y="0"/>
+          <a:chExt cx="0" cy="0"/>
+        </a:xfrm>
+      </p:grpSpPr>
+      <p:sp>
+        <p:nvSpPr>
+          <p:cNvPr id="2" name="Title 1">
+            <a:extLst>
+              <a:ext uri="{FF2B5EF4-FFF2-40B4-BE49-F238E27FC236}">
                 <a16:creationId xmlns:a16="http://schemas.microsoft.com/office/drawing/2014/main" id="{952F1CC6-60B1-4CED-9764-765E0C976F25}"/>
               </a:ext>
             </a:extLst>
@@ -6587,7 +6659,7 @@
           <p:cNvPr id="2" name="Title 1">
             <a:extLst>
               <a:ext uri="{FF2B5EF4-FFF2-40B4-BE49-F238E27FC236}">
-                <a16:creationId xmlns:a16="http://schemas.microsoft.com/office/drawing/2014/main" id="{5967F7AC-7761-4FC0-8E06-F9C14C4517D0}"/>
+                <a16:creationId xmlns:a16="http://schemas.microsoft.com/office/drawing/2014/main" id="{2E334FC3-C33D-4D60-B3C8-CEFF516F09CB}"/>
               </a:ext>
             </a:extLst>
           </p:cNvPr>
@@ -6605,7 +6677,7 @@
           <a:p>
             <a:r>
               <a:rPr lang="en-US" dirty="0"/>
-              <a:t>DEA Analysis</a:t>
+              <a:t>Our Variables</a:t>
             </a:r>
           </a:p>
         </p:txBody>
@@ -6615,7 +6687,7 @@
           <p:cNvPr id="3" name="Content Placeholder 2">
             <a:extLst>
               <a:ext uri="{FF2B5EF4-FFF2-40B4-BE49-F238E27FC236}">
-                <a16:creationId xmlns:a16="http://schemas.microsoft.com/office/drawing/2014/main" id="{DA59B5A6-A765-460B-B2A7-8078B46ED893}"/>
+                <a16:creationId xmlns:a16="http://schemas.microsoft.com/office/drawing/2014/main" id="{6665CB8C-C101-4590-B8FE-9112717C8A9B}"/>
               </a:ext>
             </a:extLst>
           </p:cNvPr>
@@ -6633,81 +6705,27 @@
           <a:p>
             <a:r>
               <a:rPr lang="en-US" dirty="0"/>
-              <a:t>Used Input Oriented CCR model.</a:t>
-            </a:r>
-          </a:p>
-          <a:p>
-            <a:endParaRPr lang="en-US" dirty="0"/>
-          </a:p>
-          <a:p>
-            <a:endParaRPr lang="en-US" dirty="0"/>
-          </a:p>
-          <a:p>
-            <a:endParaRPr lang="en-US" dirty="0"/>
-          </a:p>
-          <a:p>
-            <a:endParaRPr lang="en-US" dirty="0"/>
-          </a:p>
-          <a:p>
-            <a:endParaRPr lang="en-US" dirty="0"/>
-          </a:p>
-          <a:p>
-            <a:endParaRPr lang="en-US" dirty="0"/>
+              <a:t>Average PISA performance scores (Science, Reading and Mathematics.</a:t>
+            </a:r>
           </a:p>
           <a:p>
             <a:r>
               <a:rPr lang="en-US" dirty="0"/>
-              <a:t>Lets Implement our model..</a:t>
-            </a:r>
-          </a:p>
-        </p:txBody>
-      </p:sp>
-      <p:pic>
-        <p:nvPicPr>
-          <p:cNvPr id="4" name="Picture 3">
-            <a:extLst>
-              <a:ext uri="{FF2B5EF4-FFF2-40B4-BE49-F238E27FC236}">
-                <a16:creationId xmlns:a16="http://schemas.microsoft.com/office/drawing/2014/main" id="{69E1F8DF-96C8-4E16-9381-086AD0B07BA8}"/>
-              </a:ext>
-            </a:extLst>
-          </p:cNvPr>
-          <p:cNvPicPr>
-            <a:picLocks noChangeAspect="1"/>
-          </p:cNvPicPr>
-          <p:nvPr/>
-        </p:nvPicPr>
-        <p:blipFill>
-          <a:blip r:embed="rId2">
-            <a:extLst>
-              <a:ext uri="{BEBA8EAE-BF5A-486C-A8C5-ECC9F3942E4B}">
-                <a14:imgProps xmlns:a14="http://schemas.microsoft.com/office/drawing/2010/main">
-                  <a14:imgLayer r:embed="rId3">
-                    <a14:imgEffect>
-                      <a14:sharpenSoften amount="50000"/>
-                    </a14:imgEffect>
-                  </a14:imgLayer>
-                </a14:imgProps>
-              </a:ext>
-            </a:extLst>
-          </a:blip>
-          <a:stretch>
-            <a:fillRect/>
-          </a:stretch>
-        </p:blipFill>
-        <p:spPr>
-          <a:xfrm>
-            <a:off x="2718003" y="2202461"/>
-            <a:ext cx="6390388" cy="3091229"/>
-          </a:xfrm>
-          <a:prstGeom prst="rect">
-            <a:avLst/>
-          </a:prstGeom>
-        </p:spPr>
-      </p:pic>
+              <a:t>Total Spending per student in dollars</a:t>
+            </a:r>
+          </a:p>
+          <a:p>
+            <a:r>
+              <a:rPr lang="en-US" dirty="0"/>
+              <a:t>Overall Spending as percentage of GDP</a:t>
+            </a:r>
+          </a:p>
+        </p:txBody>
+      </p:sp>
     </p:spTree>
     <p:extLst>
       <p:ext uri="{BB962C8B-B14F-4D97-AF65-F5344CB8AC3E}">
-        <p14:creationId xmlns:p14="http://schemas.microsoft.com/office/powerpoint/2010/main" val="2517606113"/>
+        <p14:creationId xmlns:p14="http://schemas.microsoft.com/office/powerpoint/2010/main" val="407796128"/>
       </p:ext>
     </p:extLst>
   </p:cSld>
@@ -6734,12 +6752,92 @@
           <a:chExt cx="0" cy="0"/>
         </a:xfrm>
       </p:grpSpPr>
+      <p:sp>
+        <p:nvSpPr>
+          <p:cNvPr id="2" name="Title 1">
+            <a:extLst>
+              <a:ext uri="{FF2B5EF4-FFF2-40B4-BE49-F238E27FC236}">
+                <a16:creationId xmlns:a16="http://schemas.microsoft.com/office/drawing/2014/main" id="{5967F7AC-7761-4FC0-8E06-F9C14C4517D0}"/>
+              </a:ext>
+            </a:extLst>
+          </p:cNvPr>
+          <p:cNvSpPr>
+            <a:spLocks noGrp="1"/>
+          </p:cNvSpPr>
+          <p:nvPr>
+            <p:ph type="title"/>
+          </p:nvPr>
+        </p:nvSpPr>
+        <p:spPr/>
+        <p:txBody>
+          <a:bodyPr/>
+          <a:lstStyle/>
+          <a:p>
+            <a:r>
+              <a:rPr lang="en-US" dirty="0"/>
+              <a:t>DEA Analysis</a:t>
+            </a:r>
+          </a:p>
+        </p:txBody>
+      </p:sp>
+      <p:sp>
+        <p:nvSpPr>
+          <p:cNvPr id="3" name="Content Placeholder 2">
+            <a:extLst>
+              <a:ext uri="{FF2B5EF4-FFF2-40B4-BE49-F238E27FC236}">
+                <a16:creationId xmlns:a16="http://schemas.microsoft.com/office/drawing/2014/main" id="{DA59B5A6-A765-460B-B2A7-8078B46ED893}"/>
+              </a:ext>
+            </a:extLst>
+          </p:cNvPr>
+          <p:cNvSpPr>
+            <a:spLocks noGrp="1"/>
+          </p:cNvSpPr>
+          <p:nvPr>
+            <p:ph idx="1"/>
+          </p:nvPr>
+        </p:nvSpPr>
+        <p:spPr/>
+        <p:txBody>
+          <a:bodyPr/>
+          <a:lstStyle/>
+          <a:p>
+            <a:r>
+              <a:rPr lang="en-US" dirty="0"/>
+              <a:t>Used Input Oriented CCR model.</a:t>
+            </a:r>
+          </a:p>
+          <a:p>
+            <a:endParaRPr lang="en-US" dirty="0"/>
+          </a:p>
+          <a:p>
+            <a:endParaRPr lang="en-US" dirty="0"/>
+          </a:p>
+          <a:p>
+            <a:endParaRPr lang="en-US" dirty="0"/>
+          </a:p>
+          <a:p>
+            <a:endParaRPr lang="en-US" dirty="0"/>
+          </a:p>
+          <a:p>
+            <a:endParaRPr lang="en-US" dirty="0"/>
+          </a:p>
+          <a:p>
+            <a:endParaRPr lang="en-US" dirty="0"/>
+          </a:p>
+          <a:p>
+            <a:r>
+              <a:rPr lang="en-US" dirty="0"/>
+              <a:t>Lets Implement our model..</a:t>
+            </a:r>
+          </a:p>
+        </p:txBody>
+      </p:sp>
       <p:pic>
         <p:nvPicPr>
           <p:cNvPr id="4" name="Picture 3">
             <a:extLst>
               <a:ext uri="{FF2B5EF4-FFF2-40B4-BE49-F238E27FC236}">
-                <a16:creationId xmlns:a16="http://schemas.microsoft.com/office/drawing/2014/main" id="{6EEE3BCD-EB00-41FA-A990-B2CFF499C6BC}"/>
+                <a16:creationId xmlns:a16="http://schemas.microsoft.com/office/drawing/2014/main" id="{69E1F8DF-96C8-4E16-9381-086AD0B07BA8}"/>
               </a:ext>
             </a:extLst>
           </p:cNvPr>
@@ -6749,45 +6847,27 @@
           <p:nvPr/>
         </p:nvPicPr>
         <p:blipFill>
-          <a:blip r:embed="rId2"/>
+          <a:blip r:embed="rId2">
+            <a:extLst>
+              <a:ext uri="{BEBA8EAE-BF5A-486C-A8C5-ECC9F3942E4B}">
+                <a14:imgProps xmlns:a14="http://schemas.microsoft.com/office/drawing/2010/main">
+                  <a14:imgLayer r:embed="rId3">
+                    <a14:imgEffect>
+                      <a14:sharpenSoften amount="50000"/>
+                    </a14:imgEffect>
+                  </a14:imgLayer>
+                </a14:imgProps>
+              </a:ext>
+            </a:extLst>
+          </a:blip>
           <a:stretch>
             <a:fillRect/>
           </a:stretch>
         </p:blipFill>
         <p:spPr>
           <a:xfrm>
-            <a:off x="1499015" y="325900"/>
-            <a:ext cx="9026981" cy="3894407"/>
-          </a:xfrm>
-          <a:prstGeom prst="rect">
-            <a:avLst/>
-          </a:prstGeom>
-        </p:spPr>
-      </p:pic>
-      <p:pic>
-        <p:nvPicPr>
-          <p:cNvPr id="5" name="Picture 4">
-            <a:extLst>
-              <a:ext uri="{FF2B5EF4-FFF2-40B4-BE49-F238E27FC236}">
-                <a16:creationId xmlns:a16="http://schemas.microsoft.com/office/drawing/2014/main" id="{3D3E9DBB-DDB6-4841-934E-22022BE108FA}"/>
-              </a:ext>
-            </a:extLst>
-          </p:cNvPr>
-          <p:cNvPicPr>
-            <a:picLocks noChangeAspect="1"/>
-          </p:cNvPicPr>
-          <p:nvPr/>
-        </p:nvPicPr>
-        <p:blipFill>
-          <a:blip r:embed="rId3"/>
-          <a:stretch>
-            <a:fillRect/>
-          </a:stretch>
-        </p:blipFill>
-        <p:spPr>
-          <a:xfrm>
-            <a:off x="3507545" y="4220307"/>
-            <a:ext cx="5176910" cy="2511188"/>
+            <a:off x="2718003" y="2202461"/>
+            <a:ext cx="6390388" cy="3091229"/>
           </a:xfrm>
           <a:prstGeom prst="rect">
             <a:avLst/>
@@ -6797,7 +6877,7 @@
     </p:spTree>
     <p:extLst>
       <p:ext uri="{BB962C8B-B14F-4D97-AF65-F5344CB8AC3E}">
-        <p14:creationId xmlns:p14="http://schemas.microsoft.com/office/powerpoint/2010/main" val="1376706079"/>
+        <p14:creationId xmlns:p14="http://schemas.microsoft.com/office/powerpoint/2010/main" val="2517606113"/>
       </p:ext>
     </p:extLst>
   </p:cSld>
@@ -6829,7 +6909,37 @@
           <p:cNvPr id="4" name="Picture 3">
             <a:extLst>
               <a:ext uri="{FF2B5EF4-FFF2-40B4-BE49-F238E27FC236}">
-                <a16:creationId xmlns:a16="http://schemas.microsoft.com/office/drawing/2014/main" id="{3363BFAD-8594-4DCD-BC2E-B1677D7DA0BE}"/>
+                <a16:creationId xmlns:a16="http://schemas.microsoft.com/office/drawing/2014/main" id="{6EEE3BCD-EB00-41FA-A990-B2CFF499C6BC}"/>
+              </a:ext>
+            </a:extLst>
+          </p:cNvPr>
+          <p:cNvPicPr>
+            <a:picLocks noChangeAspect="1"/>
+          </p:cNvPicPr>
+          <p:nvPr/>
+        </p:nvPicPr>
+        <p:blipFill>
+          <a:blip r:embed="rId2"/>
+          <a:stretch>
+            <a:fillRect/>
+          </a:stretch>
+        </p:blipFill>
+        <p:spPr>
+          <a:xfrm>
+            <a:off x="1499015" y="325900"/>
+            <a:ext cx="9026981" cy="3894407"/>
+          </a:xfrm>
+          <a:prstGeom prst="rect">
+            <a:avLst/>
+          </a:prstGeom>
+        </p:spPr>
+      </p:pic>
+      <p:pic>
+        <p:nvPicPr>
+          <p:cNvPr id="5" name="Picture 4">
+            <a:extLst>
+              <a:ext uri="{FF2B5EF4-FFF2-40B4-BE49-F238E27FC236}">
+                <a16:creationId xmlns:a16="http://schemas.microsoft.com/office/drawing/2014/main" id="{3D3E9DBB-DDB6-4841-934E-22022BE108FA}"/>
               </a:ext>
             </a:extLst>
           </p:cNvPr>
@@ -6846,8 +6956,8 @@
         </p:blipFill>
         <p:spPr>
           <a:xfrm>
-            <a:off x="1484288" y="140828"/>
-            <a:ext cx="9223424" cy="6576343"/>
+            <a:off x="3507545" y="4220307"/>
+            <a:ext cx="5176910" cy="2511188"/>
           </a:xfrm>
           <a:prstGeom prst="rect">
             <a:avLst/>
@@ -6857,7 +6967,7 @@
     </p:spTree>
     <p:extLst>
       <p:ext uri="{BB962C8B-B14F-4D97-AF65-F5344CB8AC3E}">
-        <p14:creationId xmlns:p14="http://schemas.microsoft.com/office/powerpoint/2010/main" val="3097196736"/>
+        <p14:creationId xmlns:p14="http://schemas.microsoft.com/office/powerpoint/2010/main" val="1376706079"/>
       </p:ext>
     </p:extLst>
   </p:cSld>

</xml_diff>

<commit_message>
one more change to the ppt
</commit_message>
<xml_diff>
--- a/Project Presentation.pptx
+++ b/Project Presentation.pptx
@@ -485,6 +485,90 @@
 </file>
 
 <file path=ppt/notesSlides/notesSlide1.xml><?xml version="1.0" encoding="utf-8"?>
+<p:notes xmlns:a="http://schemas.openxmlformats.org/drawingml/2006/main" xmlns:r="http://schemas.openxmlformats.org/officeDocument/2006/relationships" xmlns:p="http://schemas.openxmlformats.org/presentationml/2006/main">
+  <p:cSld>
+    <p:spTree>
+      <p:nvGrpSpPr>
+        <p:cNvPr id="1" name=""/>
+        <p:cNvGrpSpPr/>
+        <p:nvPr/>
+      </p:nvGrpSpPr>
+      <p:grpSpPr>
+        <a:xfrm>
+          <a:off x="0" y="0"/>
+          <a:ext cx="0" cy="0"/>
+          <a:chOff x="0" y="0"/>
+          <a:chExt cx="0" cy="0"/>
+        </a:xfrm>
+      </p:grpSpPr>
+      <p:sp>
+        <p:nvSpPr>
+          <p:cNvPr id="2" name="Slide Image Placeholder 1"/>
+          <p:cNvSpPr>
+            <a:spLocks noGrp="1" noRot="1" noChangeAspect="1"/>
+          </p:cNvSpPr>
+          <p:nvPr>
+            <p:ph type="sldImg"/>
+          </p:nvPr>
+        </p:nvSpPr>
+        <p:spPr/>
+      </p:sp>
+      <p:sp>
+        <p:nvSpPr>
+          <p:cNvPr id="3" name="Notes Placeholder 2"/>
+          <p:cNvSpPr>
+            <a:spLocks noGrp="1"/>
+          </p:cNvSpPr>
+          <p:nvPr>
+            <p:ph type="body" idx="1"/>
+          </p:nvPr>
+        </p:nvSpPr>
+        <p:spPr/>
+        <p:txBody>
+          <a:bodyPr/>
+          <a:lstStyle/>
+          <a:p>
+            <a:endParaRPr lang="en-US" dirty="0"/>
+          </a:p>
+        </p:txBody>
+      </p:sp>
+      <p:sp>
+        <p:nvSpPr>
+          <p:cNvPr id="4" name="Slide Number Placeholder 3"/>
+          <p:cNvSpPr>
+            <a:spLocks noGrp="1"/>
+          </p:cNvSpPr>
+          <p:nvPr>
+            <p:ph type="sldNum" sz="quarter" idx="5"/>
+          </p:nvPr>
+        </p:nvSpPr>
+        <p:spPr/>
+        <p:txBody>
+          <a:bodyPr/>
+          <a:lstStyle/>
+          <a:p>
+            <a:fld id="{77C70274-0375-4BC9-BC63-4173DCE5C12C}" type="slidenum">
+              <a:rPr lang="en-US" smtClean="0"/>
+              <a:t>2</a:t>
+            </a:fld>
+            <a:endParaRPr lang="en-US"/>
+          </a:p>
+        </p:txBody>
+      </p:sp>
+    </p:spTree>
+    <p:extLst>
+      <p:ext uri="{BB962C8B-B14F-4D97-AF65-F5344CB8AC3E}">
+        <p14:creationId xmlns:p14="http://schemas.microsoft.com/office/powerpoint/2010/main" val="3061604427"/>
+      </p:ext>
+    </p:extLst>
+  </p:cSld>
+  <p:clrMapOvr>
+    <a:masterClrMapping/>
+  </p:clrMapOvr>
+</p:notes>
+</file>
+
+<file path=ppt/notesSlides/notesSlide2.xml><?xml version="1.0" encoding="utf-8"?>
 <p:notes xmlns:a="http://schemas.openxmlformats.org/drawingml/2006/main" xmlns:r="http://schemas.openxmlformats.org/officeDocument/2006/relationships" xmlns:p="http://schemas.openxmlformats.org/presentationml/2006/main">
   <p:cSld>
     <p:spTree>
@@ -4059,7 +4143,7 @@
           <a:p>
             <a:r>
               <a:rPr lang="en-US" dirty="0"/>
-              <a:t>Aparna raghuram</a:t>
+              <a:t>Aparna Gandikota</a:t>
             </a:r>
           </a:p>
           <a:p>
@@ -4077,7 +4161,7 @@
           <a:p>
             <a:r>
               <a:rPr lang="en-US" dirty="0"/>
-              <a:t>Samira Akhter</a:t>
+              <a:t>Samira Akther</a:t>
             </a:r>
           </a:p>
         </p:txBody>
@@ -5143,7 +5227,7 @@
           <p:nvPr/>
         </p:nvPicPr>
         <p:blipFill>
-          <a:blip r:embed="rId2">
+          <a:blip r:embed="rId3">
             <a:extLst>
               <a:ext uri="{28A0092B-C50C-407E-A947-70E740481C1C}">
                 <a14:useLocalDpi xmlns:a14="http://schemas.microsoft.com/office/drawing/2010/main" val="0"/>
@@ -6018,10 +6102,10 @@
       </p:sp>
       <p:pic>
         <p:nvPicPr>
-          <p:cNvPr id="4" name="Picture 3">
-            <a:extLst>
-              <a:ext uri="{FF2B5EF4-FFF2-40B4-BE49-F238E27FC236}">
-                <a16:creationId xmlns:a16="http://schemas.microsoft.com/office/drawing/2014/main" id="{69E1F8DF-96C8-4E16-9381-086AD0B07BA8}"/>
+          <p:cNvPr id="6" name="Picture 5">
+            <a:extLst>
+              <a:ext uri="{FF2B5EF4-FFF2-40B4-BE49-F238E27FC236}">
+                <a16:creationId xmlns:a16="http://schemas.microsoft.com/office/drawing/2014/main" id="{C9D792F7-2EFD-442B-BCAC-66A9AD289362}"/>
               </a:ext>
             </a:extLst>
           </p:cNvPr>
@@ -6042,6 +6126,9 @@
                   </a14:imgLayer>
                 </a14:imgProps>
               </a:ext>
+              <a:ext uri="{28A0092B-C50C-407E-A947-70E740481C1C}">
+                <a14:useLocalDpi xmlns:a14="http://schemas.microsoft.com/office/drawing/2010/main" val="0"/>
+              </a:ext>
             </a:extLst>
           </a:blip>
           <a:stretch>
@@ -6050,8 +6137,8 @@
         </p:blipFill>
         <p:spPr>
           <a:xfrm>
-            <a:off x="3578616" y="3111662"/>
-            <a:ext cx="6390388" cy="3091229"/>
+            <a:off x="3948503" y="3149302"/>
+            <a:ext cx="4829737" cy="2777099"/>
           </a:xfrm>
           <a:prstGeom prst="rect">
             <a:avLst/>

</xml_diff>